<commit_message>
finalize 1st 5 lectures
</commit_message>
<xml_diff>
--- a/Lectures/Lecture 3 - Evolutionary Biology.pptx
+++ b/Lectures/Lecture 3 - Evolutionary Biology.pptx
@@ -53622,7 +53622,7 @@
           <p:cNvPr id="3" name="Picture 2">
             <a:extLst>
               <a:ext uri="{FF2B5EF4-FFF2-40B4-BE49-F238E27FC236}">
-                <a16:creationId xmlns:a16="http://schemas.microsoft.com/office/drawing/2014/main" id="{739BDEAD-896D-374D-9F2B-7FB19605D865}"/>
+                <a16:creationId xmlns:a16="http://schemas.microsoft.com/office/drawing/2014/main" id="{18DFF767-6896-E242-9719-4D6DBF28CB53}"/>
               </a:ext>
             </a:extLst>
           </p:cNvPr>
@@ -53639,8 +53639,8 @@
         </p:blipFill>
         <p:spPr>
           <a:xfrm>
-            <a:off x="500066" y="1628800"/>
-            <a:ext cx="8215876" cy="3409497"/>
+            <a:off x="287524" y="1700808"/>
+            <a:ext cx="8568952" cy="3179260"/>
           </a:xfrm>
           <a:prstGeom prst="rect">
             <a:avLst/>

</xml_diff>